<commit_message>
update powerpoint con l'aggiunta del miglioramento al codice
</commit_message>
<xml_diff>
--- a/esposizione progetto_.pptx
+++ b/esposizione progetto_.pptx
@@ -212,7 +212,7 @@
           <a:p>
             <a:fld id="{77187106-C288-4220-8BAB-553AD38AC143}" type="datetimeFigureOut">
               <a:rPr lang="it-IT" smtClean="0"/>
-              <a:t>10/06/2025</a:t>
+              <a:t>15/06/2025</a:t>
             </a:fld>
             <a:endParaRPr lang="it-IT"/>
           </a:p>
@@ -1202,7 +1202,7 @@
           <a:p>
             <a:fld id="{0B00DFE0-A96D-434C-82AA-0752107C9C1D}" type="datetimeFigureOut">
               <a:rPr lang="it-IT" smtClean="0"/>
-              <a:t>10/06/2025</a:t>
+              <a:t>15/06/2025</a:t>
             </a:fld>
             <a:endParaRPr lang="it-IT"/>
           </a:p>
@@ -1456,7 +1456,7 @@
           <a:p>
             <a:fld id="{0B00DFE0-A96D-434C-82AA-0752107C9C1D}" type="datetimeFigureOut">
               <a:rPr lang="it-IT" smtClean="0"/>
-              <a:t>10/06/2025</a:t>
+              <a:t>15/06/2025</a:t>
             </a:fld>
             <a:endParaRPr lang="it-IT"/>
           </a:p>
@@ -1773,7 +1773,7 @@
           <a:p>
             <a:fld id="{0B00DFE0-A96D-434C-82AA-0752107C9C1D}" type="datetimeFigureOut">
               <a:rPr lang="it-IT" smtClean="0"/>
-              <a:t>10/06/2025</a:t>
+              <a:t>15/06/2025</a:t>
             </a:fld>
             <a:endParaRPr lang="it-IT"/>
           </a:p>
@@ -2117,7 +2117,7 @@
           <a:p>
             <a:fld id="{0B00DFE0-A96D-434C-82AA-0752107C9C1D}" type="datetimeFigureOut">
               <a:rPr lang="it-IT" smtClean="0"/>
-              <a:t>10/06/2025</a:t>
+              <a:t>15/06/2025</a:t>
             </a:fld>
             <a:endParaRPr lang="it-IT"/>
           </a:p>
@@ -2434,7 +2434,7 @@
           <a:p>
             <a:fld id="{0B00DFE0-A96D-434C-82AA-0752107C9C1D}" type="datetimeFigureOut">
               <a:rPr lang="it-IT" smtClean="0"/>
-              <a:t>10/06/2025</a:t>
+              <a:t>15/06/2025</a:t>
             </a:fld>
             <a:endParaRPr lang="it-IT"/>
           </a:p>
@@ -2830,7 +2830,7 @@
           <a:p>
             <a:fld id="{0B00DFE0-A96D-434C-82AA-0752107C9C1D}" type="datetimeFigureOut">
               <a:rPr lang="it-IT" smtClean="0"/>
-              <a:t>10/06/2025</a:t>
+              <a:t>15/06/2025</a:t>
             </a:fld>
             <a:endParaRPr lang="it-IT"/>
           </a:p>
@@ -3003,7 +3003,7 @@
           <a:p>
             <a:fld id="{0B00DFE0-A96D-434C-82AA-0752107C9C1D}" type="datetimeFigureOut">
               <a:rPr lang="it-IT" smtClean="0"/>
-              <a:t>10/06/2025</a:t>
+              <a:t>15/06/2025</a:t>
             </a:fld>
             <a:endParaRPr lang="it-IT"/>
           </a:p>
@@ -3186,7 +3186,7 @@
           <a:p>
             <a:fld id="{0B00DFE0-A96D-434C-82AA-0752107C9C1D}" type="datetimeFigureOut">
               <a:rPr lang="it-IT" smtClean="0"/>
-              <a:t>10/06/2025</a:t>
+              <a:t>15/06/2025</a:t>
             </a:fld>
             <a:endParaRPr lang="it-IT"/>
           </a:p>
@@ -3365,7 +3365,7 @@
           <a:p>
             <a:fld id="{0B00DFE0-A96D-434C-82AA-0752107C9C1D}" type="datetimeFigureOut">
               <a:rPr lang="it-IT" smtClean="0"/>
-              <a:t>10/06/2025</a:t>
+              <a:t>15/06/2025</a:t>
             </a:fld>
             <a:endParaRPr lang="it-IT"/>
           </a:p>
@@ -3615,7 +3615,7 @@
           <a:p>
             <a:fld id="{0B00DFE0-A96D-434C-82AA-0752107C9C1D}" type="datetimeFigureOut">
               <a:rPr lang="it-IT" smtClean="0"/>
-              <a:t>10/06/2025</a:t>
+              <a:t>15/06/2025</a:t>
             </a:fld>
             <a:endParaRPr lang="it-IT"/>
           </a:p>
@@ -3850,7 +3850,7 @@
           <a:p>
             <a:fld id="{0B00DFE0-A96D-434C-82AA-0752107C9C1D}" type="datetimeFigureOut">
               <a:rPr lang="it-IT" smtClean="0"/>
-              <a:t>10/06/2025</a:t>
+              <a:t>15/06/2025</a:t>
             </a:fld>
             <a:endParaRPr lang="it-IT"/>
           </a:p>
@@ -4227,7 +4227,7 @@
           <a:p>
             <a:fld id="{0B00DFE0-A96D-434C-82AA-0752107C9C1D}" type="datetimeFigureOut">
               <a:rPr lang="it-IT" smtClean="0"/>
-              <a:t>10/06/2025</a:t>
+              <a:t>15/06/2025</a:t>
             </a:fld>
             <a:endParaRPr lang="it-IT"/>
           </a:p>
@@ -4353,7 +4353,7 @@
           <a:p>
             <a:fld id="{0B00DFE0-A96D-434C-82AA-0752107C9C1D}" type="datetimeFigureOut">
               <a:rPr lang="it-IT" smtClean="0"/>
-              <a:t>10/06/2025</a:t>
+              <a:t>15/06/2025</a:t>
             </a:fld>
             <a:endParaRPr lang="it-IT"/>
           </a:p>
@@ -4451,7 +4451,7 @@
           <a:p>
             <a:fld id="{0B00DFE0-A96D-434C-82AA-0752107C9C1D}" type="datetimeFigureOut">
               <a:rPr lang="it-IT" smtClean="0"/>
-              <a:t>10/06/2025</a:t>
+              <a:t>15/06/2025</a:t>
             </a:fld>
             <a:endParaRPr lang="it-IT"/>
           </a:p>
@@ -4709,7 +4709,7 @@
           <a:p>
             <a:fld id="{0B00DFE0-A96D-434C-82AA-0752107C9C1D}" type="datetimeFigureOut">
               <a:rPr lang="it-IT" smtClean="0"/>
-              <a:t>10/06/2025</a:t>
+              <a:t>15/06/2025</a:t>
             </a:fld>
             <a:endParaRPr lang="it-IT"/>
           </a:p>
@@ -4975,7 +4975,7 @@
           <a:p>
             <a:fld id="{0B00DFE0-A96D-434C-82AA-0752107C9C1D}" type="datetimeFigureOut">
               <a:rPr lang="it-IT" smtClean="0"/>
-              <a:t>10/06/2025</a:t>
+              <a:t>15/06/2025</a:t>
             </a:fld>
             <a:endParaRPr lang="it-IT"/>
           </a:p>
@@ -5721,7 +5721,7 @@
           <a:p>
             <a:fld id="{0B00DFE0-A96D-434C-82AA-0752107C9C1D}" type="datetimeFigureOut">
               <a:rPr lang="it-IT" smtClean="0"/>
-              <a:t>10/06/2025</a:t>
+              <a:t>15/06/2025</a:t>
             </a:fld>
             <a:endParaRPr lang="it-IT"/>
           </a:p>
@@ -7286,7 +7286,7 @@
       </p:sp>
       <p:pic>
         <p:nvPicPr>
-          <p:cNvPr id="3" name="Immagine 2"/>
+          <p:cNvPr id="5" name="Immagine 4"/>
           <p:cNvPicPr>
             <a:picLocks noChangeAspect="1"/>
           </p:cNvPicPr>
@@ -7300,8 +7300,8 @@
         </p:blipFill>
         <p:spPr>
           <a:xfrm>
-            <a:off x="7809888" y="270587"/>
-            <a:ext cx="4382112" cy="3467584"/>
+            <a:off x="7649634" y="522513"/>
+            <a:ext cx="4542366" cy="3427339"/>
           </a:xfrm>
           <a:prstGeom prst="rect">
             <a:avLst/>
@@ -7390,6 +7390,36 @@
           </a:prstGeom>
         </p:spPr>
       </p:pic>
+      <p:sp>
+        <p:nvSpPr>
+          <p:cNvPr id="3" name="CasellaDiTesto 2"/>
+          <p:cNvSpPr txBox="1"/>
+          <p:nvPr/>
+        </p:nvSpPr>
+        <p:spPr>
+          <a:xfrm>
+            <a:off x="834765" y="4954555"/>
+            <a:ext cx="8610755" cy="369332"/>
+          </a:xfrm>
+          <a:prstGeom prst="rect">
+            <a:avLst/>
+          </a:prstGeom>
+          <a:noFill/>
+        </p:spPr>
+        <p:txBody>
+          <a:bodyPr wrap="none" rtlCol="0">
+            <a:spAutoFit/>
+          </a:bodyPr>
+          <a:lstStyle/>
+          <a:p>
+            <a:r>
+              <a:rPr lang="it-IT" dirty="0" smtClean="0"/>
+              <a:t>L’utente ha inoltre la possibilità di eliminare uno specifico log oppure tutti i log. </a:t>
+            </a:r>
+            <a:endParaRPr lang="it-IT" dirty="0"/>
+          </a:p>
+        </p:txBody>
+      </p:sp>
     </p:spTree>
     <p:extLst>
       <p:ext uri="{BB962C8B-B14F-4D97-AF65-F5344CB8AC3E}">
@@ -8429,13 +8459,6 @@
               </a:rPr>
               <a:t>Eliminazione log e liberazione della memoria</a:t>
             </a:r>
-            <a:endParaRPr lang="it-IT" b="1" dirty="0" smtClean="0">
-              <a:solidFill>
-                <a:schemeClr val="accent2">
-                  <a:lumMod val="75000"/>
-                </a:schemeClr>
-              </a:solidFill>
-            </a:endParaRPr>
           </a:p>
           <a:p>
             <a:pPr marL="0" indent="0">

</xml_diff>